<commit_message>
Updated Reports and Presentation for Phase 2
</commit_message>
<xml_diff>
--- a/ce4053/Reports and Presentations/Phase 2/Phase 2 Presentation.pptx
+++ b/ce4053/Reports and Presentations/Phase 2/Phase 2 Presentation.pptx
@@ -5,7 +5,7 @@
     <p:sldMasterId id="2147483659" r:id="rId1"/>
   </p:sldMasterIdLst>
   <p:notesMasterIdLst>
-    <p:notesMasterId r:id="rId9"/>
+    <p:notesMasterId r:id="rId8"/>
   </p:notesMasterIdLst>
   <p:sldIdLst>
     <p:sldId id="256" r:id="rId2"/>
@@ -14,24 +14,23 @@
     <p:sldId id="259" r:id="rId5"/>
     <p:sldId id="260" r:id="rId6"/>
     <p:sldId id="261" r:id="rId7"/>
-    <p:sldId id="262" r:id="rId8"/>
   </p:sldIdLst>
   <p:sldSz cx="9144000" cy="5143500" type="screen16x9"/>
   <p:notesSz cx="6858000" cy="9144000"/>
   <p:embeddedFontLst>
     <p:embeddedFont>
-      <p:font typeface="Lato" panose="020F0502020204030203" pitchFamily="34" charset="0"/>
-      <p:regular r:id="rId10"/>
-      <p:bold r:id="rId11"/>
-      <p:italic r:id="rId12"/>
-      <p:boldItalic r:id="rId13"/>
+      <p:font typeface="Montserrat" panose="020B0604020202020204" charset="0"/>
+      <p:regular r:id="rId9"/>
+      <p:bold r:id="rId10"/>
+      <p:italic r:id="rId11"/>
+      <p:boldItalic r:id="rId12"/>
     </p:embeddedFont>
     <p:embeddedFont>
-      <p:font typeface="Montserrat" panose="020B0604020202020204" charset="0"/>
-      <p:regular r:id="rId14"/>
-      <p:bold r:id="rId15"/>
-      <p:italic r:id="rId16"/>
-      <p:boldItalic r:id="rId17"/>
+      <p:font typeface="Lato" panose="020F0502020204030203" pitchFamily="34" charset="0"/>
+      <p:regular r:id="rId13"/>
+      <p:bold r:id="rId14"/>
+      <p:italic r:id="rId15"/>
+      <p:boldItalic r:id="rId16"/>
     </p:embeddedFont>
   </p:embeddedFontLst>
   <p:defaultTextStyle>
@@ -263,6 +262,11 @@
       </a:defRPr>
     </a:lvl9pPr>
   </p:defaultTextStyle>
+  <p:extLst>
+    <p:ext uri="{EFAFB233-063F-42B5-8137-9DF3F51BA10A}">
+      <p15:sldGuideLst xmlns:p15="http://schemas.microsoft.com/office/powerpoint/2012/main"/>
+    </p:ext>
+  </p:extLst>
 </p:presentation>
 </file>
 
@@ -1313,110 +1317,6 @@
           <a:lstStyle/>
           <a:p>
             <a:pPr marL="0" lvl="0" indent="0">
-              <a:spcBef>
-                <a:spcPts val="0"/>
-              </a:spcBef>
-              <a:spcAft>
-                <a:spcPts val="0"/>
-              </a:spcAft>
-              <a:buNone/>
-            </a:pPr>
-            <a:endParaRPr/>
-          </a:p>
-        </p:txBody>
-      </p:sp>
-    </p:spTree>
-  </p:cSld>
-  <p:clrMapOvr>
-    <a:masterClrMapping/>
-  </p:clrMapOvr>
-</p:notes>
-</file>
-
-<file path=ppt/notesSlides/notesSlide7.xml><?xml version="1.0" encoding="utf-8"?>
-<p:notes xmlns:a="http://schemas.openxmlformats.org/drawingml/2006/main" xmlns:r="http://schemas.openxmlformats.org/officeDocument/2006/relationships" xmlns:p="http://schemas.openxmlformats.org/presentationml/2006/main" showMasterSp="0" showMasterPhAnim="0">
-  <p:cSld>
-    <p:spTree>
-      <p:nvGrpSpPr>
-        <p:cNvPr id="1" name="Shape 179"/>
-        <p:cNvGrpSpPr/>
-        <p:nvPr/>
-      </p:nvGrpSpPr>
-      <p:grpSpPr>
-        <a:xfrm>
-          <a:off x="0" y="0"/>
-          <a:ext cx="0" cy="0"/>
-          <a:chOff x="0" y="0"/>
-          <a:chExt cx="0" cy="0"/>
-        </a:xfrm>
-      </p:grpSpPr>
-      <p:sp>
-        <p:nvSpPr>
-          <p:cNvPr id="180" name="Shape 180"/>
-          <p:cNvSpPr>
-            <a:spLocks noGrp="1" noRot="1" noChangeAspect="1"/>
-          </p:cNvSpPr>
-          <p:nvPr>
-            <p:ph type="sldImg" idx="2"/>
-          </p:nvPr>
-        </p:nvSpPr>
-        <p:spPr>
-          <a:xfrm>
-            <a:off x="381000" y="685800"/>
-            <a:ext cx="6096000" cy="3429000"/>
-          </a:xfrm>
-          <a:custGeom>
-            <a:avLst/>
-            <a:gdLst/>
-            <a:ahLst/>
-            <a:cxnLst/>
-            <a:rect l="0" t="0" r="0" b="0"/>
-            <a:pathLst>
-              <a:path w="120000" h="120000" extrusionOk="0">
-                <a:moveTo>
-                  <a:pt x="0" y="0"/>
-                </a:moveTo>
-                <a:lnTo>
-                  <a:pt x="120000" y="0"/>
-                </a:lnTo>
-                <a:lnTo>
-                  <a:pt x="120000" y="120000"/>
-                </a:lnTo>
-                <a:lnTo>
-                  <a:pt x="0" y="120000"/>
-                </a:lnTo>
-                <a:close/>
-              </a:path>
-            </a:pathLst>
-          </a:custGeom>
-        </p:spPr>
-      </p:sp>
-      <p:sp>
-        <p:nvSpPr>
-          <p:cNvPr id="181" name="Shape 181"/>
-          <p:cNvSpPr txBox="1">
-            <a:spLocks noGrp="1"/>
-          </p:cNvSpPr>
-          <p:nvPr>
-            <p:ph type="body" idx="1"/>
-          </p:nvPr>
-        </p:nvSpPr>
-        <p:spPr>
-          <a:xfrm>
-            <a:off x="685800" y="4343400"/>
-            <a:ext cx="5486400" cy="4114800"/>
-          </a:xfrm>
-          <a:prstGeom prst="rect">
-            <a:avLst/>
-          </a:prstGeom>
-        </p:spPr>
-        <p:txBody>
-          <a:bodyPr spcFirstLastPara="1" wrap="square" lIns="91425" tIns="91425" rIns="91425" bIns="91425" anchor="t" anchorCtr="0">
-            <a:noAutofit/>
-          </a:bodyPr>
-          <a:lstStyle/>
-          <a:p>
-            <a:pPr marL="0" lvl="0" indent="0" rtl="0">
               <a:spcBef>
                 <a:spcPts val="0"/>
               </a:spcBef>
@@ -10886,39 +10786,12 @@
       </p:sp>
       <p:pic>
         <p:nvPicPr>
-          <p:cNvPr id="152" name="Shape 152"/>
+          <p:cNvPr id="153" name="Shape 153"/>
           <p:cNvPicPr preferRelativeResize="0"/>
           <p:nvPr/>
         </p:nvPicPr>
         <p:blipFill rotWithShape="1">
           <a:blip r:embed="rId4">
-            <a:alphaModFix/>
-          </a:blip>
-          <a:srcRect l="17081" t="14457" r="44833" b="30633"/>
-          <a:stretch/>
-        </p:blipFill>
-        <p:spPr>
-          <a:xfrm>
-            <a:off x="4900050" y="2053400"/>
-            <a:ext cx="3450398" cy="2798250"/>
-          </a:xfrm>
-          <a:prstGeom prst="rect">
-            <a:avLst/>
-          </a:prstGeom>
-          <a:noFill/>
-          <a:ln>
-            <a:noFill/>
-          </a:ln>
-        </p:spPr>
-      </p:pic>
-      <p:pic>
-        <p:nvPicPr>
-          <p:cNvPr id="153" name="Shape 153"/>
-          <p:cNvPicPr preferRelativeResize="0"/>
-          <p:nvPr/>
-        </p:nvPicPr>
-        <p:blipFill rotWithShape="1">
-          <a:blip r:embed="rId5">
             <a:alphaModFix/>
           </a:blip>
           <a:srcRect l="18472" t="26970" r="43377" b="59011"/>
@@ -10936,6 +10809,35 @@
           <a:ln>
             <a:noFill/>
           </a:ln>
+        </p:spPr>
+      </p:pic>
+      <p:pic>
+        <p:nvPicPr>
+          <p:cNvPr id="3" name="Picture 2">
+            <a:extLst>
+              <a:ext uri="{FF2B5EF4-FFF2-40B4-BE49-F238E27FC236}">
+                <a16:creationId xmlns:a16="http://schemas.microsoft.com/office/drawing/2014/main" id="{24691374-2D55-49C6-88C0-6DE4916B8DEE}"/>
+              </a:ext>
+            </a:extLst>
+          </p:cNvPr>
+          <p:cNvPicPr>
+            <a:picLocks noChangeAspect="1"/>
+          </p:cNvPicPr>
+          <p:nvPr/>
+        </p:nvPicPr>
+        <p:blipFill rotWithShape="1">
+          <a:blip r:embed="rId5"/>
+          <a:srcRect l="16861" t="14664" r="16131" b="31873"/>
+          <a:stretch/>
+        </p:blipFill>
+        <p:spPr>
+          <a:xfrm>
+            <a:off x="3961579" y="2189221"/>
+            <a:ext cx="5116833" cy="2296445"/>
+          </a:xfrm>
+          <a:prstGeom prst="rect">
+            <a:avLst/>
+          </a:prstGeom>
         </p:spPr>
       </p:pic>
     </p:spTree>
@@ -11115,41 +11017,6 @@
                                         <p:cTn id="18" dur="500"/>
                                         <p:tgtEl>
                                           <p:spTgt spid="151"/>
-                                        </p:tgtEl>
-                                      </p:cBhvr>
-                                    </p:animEffect>
-                                  </p:childTnLst>
-                                </p:cTn>
-                              </p:par>
-                              <p:par>
-                                <p:cTn id="19" presetID="10" presetClass="entr" presetSubtype="0" fill="hold" nodeType="withEffect">
-                                  <p:stCondLst>
-                                    <p:cond delay="0"/>
-                                  </p:stCondLst>
-                                  <p:childTnLst>
-                                    <p:set>
-                                      <p:cBhvr>
-                                        <p:cTn id="20" dur="1" fill="hold">
-                                          <p:stCondLst>
-                                            <p:cond delay="0"/>
-                                          </p:stCondLst>
-                                        </p:cTn>
-                                        <p:tgtEl>
-                                          <p:spTgt spid="152"/>
-                                        </p:tgtEl>
-                                        <p:attrNameLst>
-                                          <p:attrName>style.visibility</p:attrName>
-                                        </p:attrNameLst>
-                                      </p:cBhvr>
-                                      <p:to>
-                                        <p:strVal val="visible"/>
-                                      </p:to>
-                                    </p:set>
-                                    <p:animEffect transition="in" filter="fade">
-                                      <p:cBhvr>
-                                        <p:cTn id="21" dur="500"/>
-                                        <p:tgtEl>
-                                          <p:spTgt spid="152"/>
                                         </p:tgtEl>
                                       </p:cBhvr>
                                     </p:animEffect>
@@ -12219,29 +12086,31 @@
       </p:sp>
       <p:pic>
         <p:nvPicPr>
-          <p:cNvPr id="171" name="Shape 171"/>
-          <p:cNvPicPr preferRelativeResize="0"/>
+          <p:cNvPr id="3" name="Picture 2">
+            <a:extLst>
+              <a:ext uri="{FF2B5EF4-FFF2-40B4-BE49-F238E27FC236}">
+                <a16:creationId xmlns:a16="http://schemas.microsoft.com/office/drawing/2014/main" id="{53EBC617-DB65-4480-9499-4EB7EA54CFE9}"/>
+              </a:ext>
+            </a:extLst>
+          </p:cNvPr>
+          <p:cNvPicPr>
+            <a:picLocks noChangeAspect="1"/>
+          </p:cNvPicPr>
           <p:nvPr/>
         </p:nvPicPr>
         <p:blipFill rotWithShape="1">
-          <a:blip r:embed="rId3">
-            <a:alphaModFix/>
-          </a:blip>
-          <a:srcRect l="21718" t="12466" r="24748" b="39065"/>
+          <a:blip r:embed="rId3"/>
+          <a:srcRect l="20950" t="13495" r="31021" b="38622"/>
           <a:stretch/>
         </p:blipFill>
         <p:spPr>
           <a:xfrm>
-            <a:off x="109875" y="1241974"/>
-            <a:ext cx="5869848" cy="2989251"/>
+            <a:off x="195963" y="1093425"/>
+            <a:ext cx="5860212" cy="3286350"/>
           </a:xfrm>
           <a:prstGeom prst="rect">
             <a:avLst/>
           </a:prstGeom>
-          <a:noFill/>
-          <a:ln>
-            <a:noFill/>
-          </a:ln>
         </p:spPr>
       </p:pic>
     </p:spTree>
@@ -12298,59 +12167,6 @@
                                         <p:cTn id="7" dur="500"/>
                                         <p:tgtEl>
                                           <p:spTgt spid="170"/>
-                                        </p:tgtEl>
-                                      </p:cBhvr>
-                                    </p:animEffect>
-                                  </p:childTnLst>
-                                </p:cTn>
-                              </p:par>
-                            </p:childTnLst>
-                          </p:cTn>
-                        </p:par>
-                      </p:childTnLst>
-                    </p:cTn>
-                  </p:par>
-                  <p:par>
-                    <p:cTn id="8" fill="hold">
-                      <p:stCondLst>
-                        <p:cond delay="indefinite"/>
-                      </p:stCondLst>
-                      <p:childTnLst>
-                        <p:par>
-                          <p:cTn id="9" fill="hold">
-                            <p:stCondLst>
-                              <p:cond delay="0"/>
-                            </p:stCondLst>
-                            <p:childTnLst>
-                              <p:par>
-                                <p:cTn id="10" presetID="10" presetClass="entr" presetSubtype="0" fill="hold" nodeType="clickEffect">
-                                  <p:stCondLst>
-                                    <p:cond delay="0"/>
-                                  </p:stCondLst>
-                                  <p:childTnLst>
-                                    <p:set>
-                                      <p:cBhvr>
-                                        <p:cTn id="11" dur="1" fill="hold">
-                                          <p:stCondLst>
-                                            <p:cond delay="0"/>
-                                          </p:stCondLst>
-                                        </p:cTn>
-                                        <p:tgtEl>
-                                          <p:spTgt spid="171"/>
-                                        </p:tgtEl>
-                                        <p:attrNameLst>
-                                          <p:attrName>style.visibility</p:attrName>
-                                        </p:attrNameLst>
-                                      </p:cBhvr>
-                                      <p:to>
-                                        <p:strVal val="visible"/>
-                                      </p:to>
-                                    </p:set>
-                                    <p:animEffect transition="in" filter="fade">
-                                      <p:cBhvr>
-                                        <p:cTn id="12" dur="500"/>
-                                        <p:tgtEl>
-                                          <p:spTgt spid="171"/>
                                         </p:tgtEl>
                                       </p:cBhvr>
                                     </p:animEffect>
@@ -12811,1524 +12627,6 @@
       </p:par>
     </p:tnLst>
   </p:timing>
-</p:sld>
-</file>
-
-<file path=ppt/slides/slide7.xml><?xml version="1.0" encoding="utf-8"?>
-<p:sld xmlns:a="http://schemas.openxmlformats.org/drawingml/2006/main" xmlns:r="http://schemas.openxmlformats.org/officeDocument/2006/relationships" xmlns:p="http://schemas.openxmlformats.org/presentationml/2006/main" show="0">
-  <p:cSld>
-    <p:spTree>
-      <p:nvGrpSpPr>
-        <p:cNvPr id="1" name="Shape 182"/>
-        <p:cNvGrpSpPr/>
-        <p:nvPr/>
-      </p:nvGrpSpPr>
-      <p:grpSpPr>
-        <a:xfrm>
-          <a:off x="0" y="0"/>
-          <a:ext cx="0" cy="0"/>
-          <a:chOff x="0" y="0"/>
-          <a:chExt cx="0" cy="0"/>
-        </a:xfrm>
-      </p:grpSpPr>
-      <p:graphicFrame>
-        <p:nvGraphicFramePr>
-          <p:cNvPr id="183" name="Shape 183"/>
-          <p:cNvGraphicFramePr/>
-          <p:nvPr/>
-        </p:nvGraphicFramePr>
-        <p:xfrm>
-          <a:off x="638725" y="1482700"/>
-          <a:ext cx="3000000" cy="3000000"/>
-        </p:xfrm>
-        <a:graphic>
-          <a:graphicData uri="http://schemas.openxmlformats.org/drawingml/2006/table">
-            <a:tbl>
-              <a:tblPr>
-                <a:noFill/>
-                <a:tableStyleId>{2071E5C0-914D-41C4-B23F-AADE627A86D3}</a:tableStyleId>
-              </a:tblPr>
-              <a:tblGrid>
-                <a:gridCol w="1682600">
-                  <a:extLst>
-                    <a:ext uri="{9D8B030D-6E8A-4147-A177-3AD203B41FA5}">
-                      <a16:colId xmlns:a16="http://schemas.microsoft.com/office/drawing/2014/main" val="20000"/>
-                    </a:ext>
-                  </a:extLst>
-                </a:gridCol>
-                <a:gridCol w="886850">
-                  <a:extLst>
-                    <a:ext uri="{9D8B030D-6E8A-4147-A177-3AD203B41FA5}">
-                      <a16:colId xmlns:a16="http://schemas.microsoft.com/office/drawing/2014/main" val="20001"/>
-                    </a:ext>
-                  </a:extLst>
-                </a:gridCol>
-                <a:gridCol w="1597725">
-                  <a:extLst>
-                    <a:ext uri="{9D8B030D-6E8A-4147-A177-3AD203B41FA5}">
-                      <a16:colId xmlns:a16="http://schemas.microsoft.com/office/drawing/2014/main" val="20002"/>
-                    </a:ext>
-                  </a:extLst>
-                </a:gridCol>
-                <a:gridCol w="889500">
-                  <a:extLst>
-                    <a:ext uri="{9D8B030D-6E8A-4147-A177-3AD203B41FA5}">
-                      <a16:colId xmlns:a16="http://schemas.microsoft.com/office/drawing/2014/main" val="20003"/>
-                    </a:ext>
-                  </a:extLst>
-                </a:gridCol>
-                <a:gridCol w="1726550">
-                  <a:extLst>
-                    <a:ext uri="{9D8B030D-6E8A-4147-A177-3AD203B41FA5}">
-                      <a16:colId xmlns:a16="http://schemas.microsoft.com/office/drawing/2014/main" val="20004"/>
-                    </a:ext>
-                  </a:extLst>
-                </a:gridCol>
-                <a:gridCol w="1120000">
-                  <a:extLst>
-                    <a:ext uri="{9D8B030D-6E8A-4147-A177-3AD203B41FA5}">
-                      <a16:colId xmlns:a16="http://schemas.microsoft.com/office/drawing/2014/main" val="20005"/>
-                    </a:ext>
-                  </a:extLst>
-                </a:gridCol>
-              </a:tblGrid>
-              <a:tr h="464250">
-                <a:tc>
-                  <a:txBody>
-                    <a:bodyPr/>
-                    <a:lstStyle/>
-                    <a:p>
-                      <a:pPr marL="0" lvl="0" indent="0" rtl="0">
-                        <a:spcBef>
-                          <a:spcPts val="0"/>
-                        </a:spcBef>
-                        <a:spcAft>
-                          <a:spcPts val="0"/>
-                        </a:spcAft>
-                        <a:buNone/>
-                      </a:pPr>
-                      <a:r>
-                        <a:rPr lang="en-GB" b="1">
-                          <a:solidFill>
-                            <a:srgbClr val="FFFFFF"/>
-                          </a:solidFill>
-                        </a:rPr>
-                        <a:t>Function</a:t>
-                      </a:r>
-                      <a:endParaRPr b="1">
-                        <a:solidFill>
-                          <a:srgbClr val="FFFFFF"/>
-                        </a:solidFill>
-                      </a:endParaRPr>
-                    </a:p>
-                  </a:txBody>
-                  <a:tcPr marL="91425" marR="91425" marT="91425" marB="91425"/>
-                </a:tc>
-                <a:tc>
-                  <a:txBody>
-                    <a:bodyPr/>
-                    <a:lstStyle/>
-                    <a:p>
-                      <a:pPr marL="0" lvl="0" indent="0" rtl="0">
-                        <a:spcBef>
-                          <a:spcPts val="0"/>
-                        </a:spcBef>
-                        <a:spcAft>
-                          <a:spcPts val="0"/>
-                        </a:spcAft>
-                        <a:buNone/>
-                      </a:pPr>
-                      <a:r>
-                        <a:rPr lang="en-GB" b="1">
-                          <a:solidFill>
-                            <a:srgbClr val="FFFFFF"/>
-                          </a:solidFill>
-                        </a:rPr>
-                        <a:t>Time</a:t>
-                      </a:r>
-                      <a:br>
-                        <a:rPr lang="en-GB" b="1">
-                          <a:solidFill>
-                            <a:srgbClr val="FFFFFF"/>
-                          </a:solidFill>
-                        </a:rPr>
-                      </a:br>
-                      <a:r>
-                        <a:rPr lang="en-GB" b="1">
-                          <a:solidFill>
-                            <a:srgbClr val="FFFFFF"/>
-                          </a:solidFill>
-                        </a:rPr>
-                        <a:t>(cycles)</a:t>
-                      </a:r>
-                      <a:endParaRPr b="1">
-                        <a:solidFill>
-                          <a:srgbClr val="FFFFFF"/>
-                        </a:solidFill>
-                      </a:endParaRPr>
-                    </a:p>
-                  </a:txBody>
-                  <a:tcPr marL="91425" marR="91425" marT="91425" marB="91425"/>
-                </a:tc>
-                <a:tc>
-                  <a:txBody>
-                    <a:bodyPr/>
-                    <a:lstStyle/>
-                    <a:p>
-                      <a:pPr marL="0" lvl="0" indent="0" rtl="0">
-                        <a:spcBef>
-                          <a:spcPts val="0"/>
-                        </a:spcBef>
-                        <a:spcAft>
-                          <a:spcPts val="0"/>
-                        </a:spcAft>
-                        <a:buNone/>
-                      </a:pPr>
-                      <a:r>
-                        <a:rPr lang="en-GB" b="1">
-                          <a:solidFill>
-                            <a:srgbClr val="FFFFFF"/>
-                          </a:solidFill>
-                        </a:rPr>
-                        <a:t>Function</a:t>
-                      </a:r>
-                      <a:endParaRPr b="1">
-                        <a:solidFill>
-                          <a:srgbClr val="FFFFFF"/>
-                        </a:solidFill>
-                      </a:endParaRPr>
-                    </a:p>
-                  </a:txBody>
-                  <a:tcPr marL="91425" marR="91425" marT="91425" marB="91425"/>
-                </a:tc>
-                <a:tc>
-                  <a:txBody>
-                    <a:bodyPr/>
-                    <a:lstStyle/>
-                    <a:p>
-                      <a:pPr marL="0" lvl="0" indent="0" rtl="0">
-                        <a:spcBef>
-                          <a:spcPts val="0"/>
-                        </a:spcBef>
-                        <a:spcAft>
-                          <a:spcPts val="0"/>
-                        </a:spcAft>
-                        <a:buNone/>
-                      </a:pPr>
-                      <a:r>
-                        <a:rPr lang="en-GB" b="1">
-                          <a:solidFill>
-                            <a:srgbClr val="FFFFFF"/>
-                          </a:solidFill>
-                        </a:rPr>
-                        <a:t>Time</a:t>
-                      </a:r>
-                      <a:r>
-                        <a:rPr lang="en-GB" b="1">
-                          <a:solidFill>
-                            <a:schemeClr val="lt1"/>
-                          </a:solidFill>
-                        </a:rPr>
-                        <a:t> (cycles)</a:t>
-                      </a:r>
-                      <a:endParaRPr b="1">
-                        <a:solidFill>
-                          <a:srgbClr val="FFFFFF"/>
-                        </a:solidFill>
-                      </a:endParaRPr>
-                    </a:p>
-                  </a:txBody>
-                  <a:tcPr marL="91425" marR="91425" marT="91425" marB="91425">
-                    <a:lnR w="9525" cap="flat" cmpd="sng">
-                      <a:solidFill>
-                        <a:srgbClr val="9E9E9E"/>
-                      </a:solidFill>
-                      <a:prstDash val="solid"/>
-                      <a:round/>
-                      <a:headEnd type="none" w="sm" len="sm"/>
-                      <a:tailEnd type="none" w="sm" len="sm"/>
-                    </a:lnR>
-                  </a:tcPr>
-                </a:tc>
-                <a:tc>
-                  <a:txBody>
-                    <a:bodyPr/>
-                    <a:lstStyle/>
-                    <a:p>
-                      <a:pPr marL="0" lvl="0" indent="0" rtl="0">
-                        <a:spcBef>
-                          <a:spcPts val="0"/>
-                        </a:spcBef>
-                        <a:spcAft>
-                          <a:spcPts val="0"/>
-                        </a:spcAft>
-                        <a:buNone/>
-                      </a:pPr>
-                      <a:r>
-                        <a:rPr lang="en-GB" b="1">
-                          <a:solidFill>
-                            <a:srgbClr val="FFFFFF"/>
-                          </a:solidFill>
-                        </a:rPr>
-                        <a:t>Function</a:t>
-                      </a:r>
-                      <a:endParaRPr b="1">
-                        <a:solidFill>
-                          <a:srgbClr val="FFFFFF"/>
-                        </a:solidFill>
-                      </a:endParaRPr>
-                    </a:p>
-                  </a:txBody>
-                  <a:tcPr marL="91425" marR="91425" marT="91425" marB="91425">
-                    <a:lnL w="9525" cap="flat" cmpd="sng">
-                      <a:solidFill>
-                        <a:srgbClr val="9E9E9E"/>
-                      </a:solidFill>
-                      <a:prstDash val="solid"/>
-                      <a:round/>
-                      <a:headEnd type="none" w="sm" len="sm"/>
-                      <a:tailEnd type="none" w="sm" len="sm"/>
-                    </a:lnL>
-                    <a:lnR w="9525" cap="flat" cmpd="sng">
-                      <a:solidFill>
-                        <a:srgbClr val="9E9E9E"/>
-                      </a:solidFill>
-                      <a:prstDash val="solid"/>
-                      <a:round/>
-                      <a:headEnd type="none" w="sm" len="sm"/>
-                      <a:tailEnd type="none" w="sm" len="sm"/>
-                    </a:lnR>
-                    <a:lnT w="9525" cap="flat" cmpd="sng">
-                      <a:solidFill>
-                        <a:srgbClr val="9E9E9E"/>
-                      </a:solidFill>
-                      <a:prstDash val="solid"/>
-                      <a:round/>
-                      <a:headEnd type="none" w="sm" len="sm"/>
-                      <a:tailEnd type="none" w="sm" len="sm"/>
-                    </a:lnT>
-                    <a:lnB w="9525" cap="flat" cmpd="sng">
-                      <a:solidFill>
-                        <a:srgbClr val="9E9E9E"/>
-                      </a:solidFill>
-                      <a:prstDash val="solid"/>
-                      <a:round/>
-                      <a:headEnd type="none" w="sm" len="sm"/>
-                      <a:tailEnd type="none" w="sm" len="sm"/>
-                    </a:lnB>
-                  </a:tcPr>
-                </a:tc>
-                <a:tc>
-                  <a:txBody>
-                    <a:bodyPr/>
-                    <a:lstStyle/>
-                    <a:p>
-                      <a:pPr marL="0" lvl="0" indent="0" rtl="0">
-                        <a:spcBef>
-                          <a:spcPts val="0"/>
-                        </a:spcBef>
-                        <a:spcAft>
-                          <a:spcPts val="0"/>
-                        </a:spcAft>
-                        <a:buNone/>
-                      </a:pPr>
-                      <a:r>
-                        <a:rPr lang="en-GB" b="1">
-                          <a:solidFill>
-                            <a:srgbClr val="FFFFFF"/>
-                          </a:solidFill>
-                        </a:rPr>
-                        <a:t>Time</a:t>
-                      </a:r>
-                      <a:r>
-                        <a:rPr lang="en-GB" b="1">
-                          <a:solidFill>
-                            <a:schemeClr val="lt1"/>
-                          </a:solidFill>
-                        </a:rPr>
-                        <a:t> </a:t>
-                      </a:r>
-                      <a:br>
-                        <a:rPr lang="en-GB" b="1">
-                          <a:solidFill>
-                            <a:schemeClr val="lt1"/>
-                          </a:solidFill>
-                        </a:rPr>
-                      </a:br>
-                      <a:r>
-                        <a:rPr lang="en-GB" b="1">
-                          <a:solidFill>
-                            <a:schemeClr val="lt1"/>
-                          </a:solidFill>
-                        </a:rPr>
-                        <a:t>(cycles)</a:t>
-                      </a:r>
-                      <a:endParaRPr b="1">
-                        <a:solidFill>
-                          <a:srgbClr val="FFFFFF"/>
-                        </a:solidFill>
-                      </a:endParaRPr>
-                    </a:p>
-                  </a:txBody>
-                  <a:tcPr marL="91425" marR="91425" marT="91425" marB="91425">
-                    <a:lnL w="9525" cap="flat" cmpd="sng">
-                      <a:solidFill>
-                        <a:srgbClr val="9E9E9E"/>
-                      </a:solidFill>
-                      <a:prstDash val="solid"/>
-                      <a:round/>
-                      <a:headEnd type="none" w="sm" len="sm"/>
-                      <a:tailEnd type="none" w="sm" len="sm"/>
-                    </a:lnL>
-                    <a:lnR w="9525" cap="flat" cmpd="sng">
-                      <a:solidFill>
-                        <a:srgbClr val="9E9E9E"/>
-                      </a:solidFill>
-                      <a:prstDash val="solid"/>
-                      <a:round/>
-                      <a:headEnd type="none" w="sm" len="sm"/>
-                      <a:tailEnd type="none" w="sm" len="sm"/>
-                    </a:lnR>
-                    <a:lnT w="9525" cap="flat" cmpd="sng">
-                      <a:solidFill>
-                        <a:srgbClr val="9E9E9E"/>
-                      </a:solidFill>
-                      <a:prstDash val="solid"/>
-                      <a:round/>
-                      <a:headEnd type="none" w="sm" len="sm"/>
-                      <a:tailEnd type="none" w="sm" len="sm"/>
-                    </a:lnT>
-                    <a:lnB w="9525" cap="flat" cmpd="sng">
-                      <a:solidFill>
-                        <a:srgbClr val="9E9E9E"/>
-                      </a:solidFill>
-                      <a:prstDash val="solid"/>
-                      <a:round/>
-                      <a:headEnd type="none" w="sm" len="sm"/>
-                      <a:tailEnd type="none" w="sm" len="sm"/>
-                    </a:lnB>
-                  </a:tcPr>
-                </a:tc>
-                <a:extLst>
-                  <a:ext uri="{0D108BD9-81ED-4DB2-BD59-A6C34878D82A}">
-                    <a16:rowId xmlns:a16="http://schemas.microsoft.com/office/drawing/2014/main" val="10000"/>
-                  </a:ext>
-                </a:extLst>
-              </a:tr>
-              <a:tr h="512225">
-                <a:tc>
-                  <a:txBody>
-                    <a:bodyPr/>
-                    <a:lstStyle/>
-                    <a:p>
-                      <a:pPr marL="0" lvl="0" indent="0" rtl="0">
-                        <a:spcBef>
-                          <a:spcPts val="0"/>
-                        </a:spcBef>
-                        <a:spcAft>
-                          <a:spcPts val="0"/>
-                        </a:spcAft>
-                        <a:buNone/>
-                      </a:pPr>
-                      <a:r>
-                        <a:rPr lang="en-GB" sz="1200">
-                          <a:solidFill>
-                            <a:srgbClr val="FFFFFF"/>
-                          </a:solidFill>
-                        </a:rPr>
-                        <a:t>OS_revive_rec_task</a:t>
-                      </a:r>
-                      <a:endParaRPr sz="1200">
-                        <a:solidFill>
-                          <a:srgbClr val="FFFFFF"/>
-                        </a:solidFill>
-                      </a:endParaRPr>
-                    </a:p>
-                    <a:p>
-                      <a:pPr marL="0" lvl="0" indent="0" rtl="0">
-                        <a:spcBef>
-                          <a:spcPts val="0"/>
-                        </a:spcBef>
-                        <a:spcAft>
-                          <a:spcPts val="0"/>
-                        </a:spcAft>
-                        <a:buNone/>
-                      </a:pPr>
-                      <a:r>
-                        <a:rPr lang="en-GB" sz="1200">
-                          <a:solidFill>
-                            <a:srgbClr val="FFFFFF"/>
-                          </a:solidFill>
-                        </a:rPr>
-                        <a:t>(sync release tasks)</a:t>
-                      </a:r>
-                      <a:endParaRPr sz="1200">
-                        <a:solidFill>
-                          <a:srgbClr val="FFFFFF"/>
-                        </a:solidFill>
-                      </a:endParaRPr>
-                    </a:p>
-                  </a:txBody>
-                  <a:tcPr marL="91425" marR="91425" marT="91425" marB="91425"/>
-                </a:tc>
-                <a:tc>
-                  <a:txBody>
-                    <a:bodyPr/>
-                    <a:lstStyle/>
-                    <a:p>
-                      <a:pPr marL="0" lvl="0" indent="0" rtl="0">
-                        <a:spcBef>
-                          <a:spcPts val="0"/>
-                        </a:spcBef>
-                        <a:spcAft>
-                          <a:spcPts val="0"/>
-                        </a:spcAft>
-                        <a:buNone/>
-                      </a:pPr>
-                      <a:r>
-                        <a:rPr lang="en-GB" sz="1200">
-                          <a:solidFill>
-                            <a:srgbClr val="FFFFFF"/>
-                          </a:solidFill>
-                        </a:rPr>
-                        <a:t>1291</a:t>
-                      </a:r>
-                      <a:endParaRPr sz="1200">
-                        <a:solidFill>
-                          <a:srgbClr val="FFFFFF"/>
-                        </a:solidFill>
-                      </a:endParaRPr>
-                    </a:p>
-                  </a:txBody>
-                  <a:tcPr marL="91425" marR="91425" marT="91425" marB="91425"/>
-                </a:tc>
-                <a:tc>
-                  <a:txBody>
-                    <a:bodyPr/>
-                    <a:lstStyle/>
-                    <a:p>
-                      <a:pPr marL="0" lvl="0" indent="0" rtl="0">
-                        <a:spcBef>
-                          <a:spcPts val="0"/>
-                        </a:spcBef>
-                        <a:spcAft>
-                          <a:spcPts val="0"/>
-                        </a:spcAft>
-                        <a:buNone/>
-                      </a:pPr>
-                      <a:r>
-                        <a:rPr lang="en-GB" sz="1200">
-                          <a:solidFill>
-                            <a:srgbClr val="FFFFFF"/>
-                          </a:solidFill>
-                        </a:rPr>
-                        <a:t>OSSched</a:t>
-                      </a:r>
-                      <a:endParaRPr sz="1200">
-                        <a:solidFill>
-                          <a:srgbClr val="FFFFFF"/>
-                        </a:solidFill>
-                      </a:endParaRPr>
-                    </a:p>
-                    <a:p>
-                      <a:pPr marL="0" lvl="0" indent="0" rtl="0">
-                        <a:spcBef>
-                          <a:spcPts val="0"/>
-                        </a:spcBef>
-                        <a:spcAft>
-                          <a:spcPts val="0"/>
-                        </a:spcAft>
-                        <a:buNone/>
-                      </a:pPr>
-                      <a:r>
-                        <a:rPr lang="en-GB" sz="1200">
-                          <a:solidFill>
-                            <a:srgbClr val="FFFFFF"/>
-                          </a:solidFill>
-                        </a:rPr>
-                        <a:t>(without EDF)</a:t>
-                      </a:r>
-                      <a:endParaRPr sz="1200">
-                        <a:solidFill>
-                          <a:srgbClr val="FFFFFF"/>
-                        </a:solidFill>
-                      </a:endParaRPr>
-                    </a:p>
-                  </a:txBody>
-                  <a:tcPr marL="91425" marR="91425" marT="91425" marB="91425"/>
-                </a:tc>
-                <a:tc>
-                  <a:txBody>
-                    <a:bodyPr/>
-                    <a:lstStyle/>
-                    <a:p>
-                      <a:pPr marL="0" lvl="0" indent="0" rtl="0">
-                        <a:spcBef>
-                          <a:spcPts val="0"/>
-                        </a:spcBef>
-                        <a:spcAft>
-                          <a:spcPts val="0"/>
-                        </a:spcAft>
-                        <a:buNone/>
-                      </a:pPr>
-                      <a:r>
-                        <a:rPr lang="en-GB" sz="1200">
-                          <a:solidFill>
-                            <a:srgbClr val="FFFFFF"/>
-                          </a:solidFill>
-                        </a:rPr>
-                        <a:t>116</a:t>
-                      </a:r>
-                      <a:endParaRPr sz="1200">
-                        <a:solidFill>
-                          <a:srgbClr val="FFFFFF"/>
-                        </a:solidFill>
-                      </a:endParaRPr>
-                    </a:p>
-                  </a:txBody>
-                  <a:tcPr marL="91425" marR="91425" marT="91425" marB="91425">
-                    <a:lnR w="9525" cap="flat" cmpd="sng">
-                      <a:solidFill>
-                        <a:srgbClr val="9E9E9E"/>
-                      </a:solidFill>
-                      <a:prstDash val="solid"/>
-                      <a:round/>
-                      <a:headEnd type="none" w="sm" len="sm"/>
-                      <a:tailEnd type="none" w="sm" len="sm"/>
-                    </a:lnR>
-                  </a:tcPr>
-                </a:tc>
-                <a:tc>
-                  <a:txBody>
-                    <a:bodyPr/>
-                    <a:lstStyle/>
-                    <a:p>
-                      <a:pPr marL="0" lvl="0" indent="0" rtl="0">
-                        <a:spcBef>
-                          <a:spcPts val="0"/>
-                        </a:spcBef>
-                        <a:spcAft>
-                          <a:spcPts val="0"/>
-                        </a:spcAft>
-                        <a:buNone/>
-                      </a:pPr>
-                      <a:r>
-                        <a:rPr lang="en-GB" sz="1200">
-                          <a:solidFill>
-                            <a:srgbClr val="FFFFFF"/>
-                          </a:solidFill>
-                        </a:rPr>
-                        <a:t>OSMutexPend</a:t>
-                      </a:r>
-                      <a:endParaRPr sz="1200">
-                        <a:solidFill>
-                          <a:srgbClr val="FFFFFF"/>
-                        </a:solidFill>
-                      </a:endParaRPr>
-                    </a:p>
-                  </a:txBody>
-                  <a:tcPr marL="91425" marR="91425" marT="91425" marB="91425">
-                    <a:lnL w="9525" cap="flat" cmpd="sng">
-                      <a:solidFill>
-                        <a:srgbClr val="9E9E9E"/>
-                      </a:solidFill>
-                      <a:prstDash val="solid"/>
-                      <a:round/>
-                      <a:headEnd type="none" w="sm" len="sm"/>
-                      <a:tailEnd type="none" w="sm" len="sm"/>
-                    </a:lnL>
-                    <a:lnR w="9525" cap="flat" cmpd="sng">
-                      <a:solidFill>
-                        <a:srgbClr val="9E9E9E"/>
-                      </a:solidFill>
-                      <a:prstDash val="solid"/>
-                      <a:round/>
-                      <a:headEnd type="none" w="sm" len="sm"/>
-                      <a:tailEnd type="none" w="sm" len="sm"/>
-                    </a:lnR>
-                    <a:lnT w="9525" cap="flat" cmpd="sng">
-                      <a:solidFill>
-                        <a:srgbClr val="9E9E9E"/>
-                      </a:solidFill>
-                      <a:prstDash val="solid"/>
-                      <a:round/>
-                      <a:headEnd type="none" w="sm" len="sm"/>
-                      <a:tailEnd type="none" w="sm" len="sm"/>
-                    </a:lnT>
-                    <a:lnB w="9525" cap="flat" cmpd="sng">
-                      <a:solidFill>
-                        <a:srgbClr val="9E9E9E"/>
-                      </a:solidFill>
-                      <a:prstDash val="solid"/>
-                      <a:round/>
-                      <a:headEnd type="none" w="sm" len="sm"/>
-                      <a:tailEnd type="none" w="sm" len="sm"/>
-                    </a:lnB>
-                  </a:tcPr>
-                </a:tc>
-                <a:tc>
-                  <a:txBody>
-                    <a:bodyPr/>
-                    <a:lstStyle/>
-                    <a:p>
-                      <a:pPr marL="0" lvl="0" indent="0" rtl="0">
-                        <a:spcBef>
-                          <a:spcPts val="0"/>
-                        </a:spcBef>
-                        <a:spcAft>
-                          <a:spcPts val="0"/>
-                        </a:spcAft>
-                        <a:buNone/>
-                      </a:pPr>
-                      <a:r>
-                        <a:rPr lang="en-GB" sz="1200">
-                          <a:solidFill>
-                            <a:srgbClr val="FFFFFF"/>
-                          </a:solidFill>
-                        </a:rPr>
-                        <a:t>225</a:t>
-                      </a:r>
-                      <a:endParaRPr sz="1200">
-                        <a:solidFill>
-                          <a:srgbClr val="FFFFFF"/>
-                        </a:solidFill>
-                      </a:endParaRPr>
-                    </a:p>
-                  </a:txBody>
-                  <a:tcPr marL="91425" marR="91425" marT="91425" marB="91425">
-                    <a:lnL w="9525" cap="flat" cmpd="sng">
-                      <a:solidFill>
-                        <a:srgbClr val="9E9E9E"/>
-                      </a:solidFill>
-                      <a:prstDash val="solid"/>
-                      <a:round/>
-                      <a:headEnd type="none" w="sm" len="sm"/>
-                      <a:tailEnd type="none" w="sm" len="sm"/>
-                    </a:lnL>
-                    <a:lnR w="9525" cap="flat" cmpd="sng">
-                      <a:solidFill>
-                        <a:srgbClr val="9E9E9E"/>
-                      </a:solidFill>
-                      <a:prstDash val="solid"/>
-                      <a:round/>
-                      <a:headEnd type="none" w="sm" len="sm"/>
-                      <a:tailEnd type="none" w="sm" len="sm"/>
-                    </a:lnR>
-                    <a:lnT w="9525" cap="flat" cmpd="sng">
-                      <a:solidFill>
-                        <a:srgbClr val="9E9E9E"/>
-                      </a:solidFill>
-                      <a:prstDash val="solid"/>
-                      <a:round/>
-                      <a:headEnd type="none" w="sm" len="sm"/>
-                      <a:tailEnd type="none" w="sm" len="sm"/>
-                    </a:lnT>
-                    <a:lnB w="9525" cap="flat" cmpd="sng">
-                      <a:solidFill>
-                        <a:srgbClr val="9E9E9E"/>
-                      </a:solidFill>
-                      <a:prstDash val="solid"/>
-                      <a:round/>
-                      <a:headEnd type="none" w="sm" len="sm"/>
-                      <a:tailEnd type="none" w="sm" len="sm"/>
-                    </a:lnB>
-                  </a:tcPr>
-                </a:tc>
-                <a:extLst>
-                  <a:ext uri="{0D108BD9-81ED-4DB2-BD59-A6C34878D82A}">
-                    <a16:rowId xmlns:a16="http://schemas.microsoft.com/office/drawing/2014/main" val="10001"/>
-                  </a:ext>
-                </a:extLst>
-              </a:tr>
-              <a:tr h="521475">
-                <a:tc>
-                  <a:txBody>
-                    <a:bodyPr/>
-                    <a:lstStyle/>
-                    <a:p>
-                      <a:pPr marL="0" marR="0" lvl="0" indent="0" algn="l" rtl="0">
-                        <a:lnSpc>
-                          <a:spcPct val="100000"/>
-                        </a:lnSpc>
-                        <a:spcBef>
-                          <a:spcPts val="0"/>
-                        </a:spcBef>
-                        <a:spcAft>
-                          <a:spcPts val="0"/>
-                        </a:spcAft>
-                        <a:buNone/>
-                      </a:pPr>
-                      <a:r>
-                        <a:rPr lang="en-GB" sz="1200">
-                          <a:solidFill>
-                            <a:srgbClr val="FFFFFF"/>
-                          </a:solidFill>
-                        </a:rPr>
-                        <a:t>OS_revive_rec_task</a:t>
-                      </a:r>
-                      <a:endParaRPr sz="1200">
-                        <a:solidFill>
-                          <a:srgbClr val="FFFFFF"/>
-                        </a:solidFill>
-                      </a:endParaRPr>
-                    </a:p>
-                    <a:p>
-                      <a:pPr marL="0" marR="0" lvl="0" indent="0" algn="l" rtl="0">
-                        <a:lnSpc>
-                          <a:spcPct val="100000"/>
-                        </a:lnSpc>
-                        <a:spcBef>
-                          <a:spcPts val="0"/>
-                        </a:spcBef>
-                        <a:spcAft>
-                          <a:spcPts val="0"/>
-                        </a:spcAft>
-                        <a:buNone/>
-                      </a:pPr>
-                      <a:r>
-                        <a:rPr lang="en-GB" sz="1200">
-                          <a:solidFill>
-                            <a:srgbClr val="FFFFFF"/>
-                          </a:solidFill>
-                        </a:rPr>
-                        <a:t>(revive recursive task)</a:t>
-                      </a:r>
-                      <a:endParaRPr sz="1200">
-                        <a:solidFill>
-                          <a:srgbClr val="FFFFFF"/>
-                        </a:solidFill>
-                      </a:endParaRPr>
-                    </a:p>
-                  </a:txBody>
-                  <a:tcPr marL="91425" marR="91425" marT="91425" marB="91425"/>
-                </a:tc>
-                <a:tc>
-                  <a:txBody>
-                    <a:bodyPr/>
-                    <a:lstStyle/>
-                    <a:p>
-                      <a:pPr marL="0" marR="0" lvl="0" indent="0" algn="l" rtl="0">
-                        <a:lnSpc>
-                          <a:spcPct val="100000"/>
-                        </a:lnSpc>
-                        <a:spcBef>
-                          <a:spcPts val="0"/>
-                        </a:spcBef>
-                        <a:spcAft>
-                          <a:spcPts val="0"/>
-                        </a:spcAft>
-                        <a:buNone/>
-                      </a:pPr>
-                      <a:r>
-                        <a:rPr lang="en-GB" sz="1200">
-                          <a:solidFill>
-                            <a:srgbClr val="FFFFFF"/>
-                          </a:solidFill>
-                        </a:rPr>
-                        <a:t>1925</a:t>
-                      </a:r>
-                      <a:endParaRPr sz="1200">
-                        <a:solidFill>
-                          <a:srgbClr val="FFFFFF"/>
-                        </a:solidFill>
-                      </a:endParaRPr>
-                    </a:p>
-                  </a:txBody>
-                  <a:tcPr marL="91425" marR="91425" marT="91425" marB="91425"/>
-                </a:tc>
-                <a:tc>
-                  <a:txBody>
-                    <a:bodyPr/>
-                    <a:lstStyle/>
-                    <a:p>
-                      <a:pPr marL="0" marR="0" lvl="0" indent="0" algn="l" rtl="0">
-                        <a:lnSpc>
-                          <a:spcPct val="100000"/>
-                        </a:lnSpc>
-                        <a:spcBef>
-                          <a:spcPts val="0"/>
-                        </a:spcBef>
-                        <a:spcAft>
-                          <a:spcPts val="0"/>
-                        </a:spcAft>
-                        <a:buNone/>
-                      </a:pPr>
-                      <a:r>
-                        <a:rPr lang="en-GB" sz="1200">
-                          <a:solidFill>
-                            <a:srgbClr val="FFFFFF"/>
-                          </a:solidFill>
-                        </a:rPr>
-                        <a:t>OSSched</a:t>
-                      </a:r>
-                      <a:endParaRPr sz="1200">
-                        <a:solidFill>
-                          <a:srgbClr val="FFFFFF"/>
-                        </a:solidFill>
-                      </a:endParaRPr>
-                    </a:p>
-                    <a:p>
-                      <a:pPr marL="0" marR="0" lvl="0" indent="0" algn="l" rtl="0">
-                        <a:lnSpc>
-                          <a:spcPct val="100000"/>
-                        </a:lnSpc>
-                        <a:spcBef>
-                          <a:spcPts val="0"/>
-                        </a:spcBef>
-                        <a:spcAft>
-                          <a:spcPts val="0"/>
-                        </a:spcAft>
-                        <a:buNone/>
-                      </a:pPr>
-                      <a:r>
-                        <a:rPr lang="en-GB" sz="1200">
-                          <a:solidFill>
-                            <a:srgbClr val="FFFFFF"/>
-                          </a:solidFill>
-                        </a:rPr>
-                        <a:t>(with EDF)</a:t>
-                      </a:r>
-                      <a:endParaRPr sz="1200">
-                        <a:solidFill>
-                          <a:srgbClr val="FFFFFF"/>
-                        </a:solidFill>
-                      </a:endParaRPr>
-                    </a:p>
-                  </a:txBody>
-                  <a:tcPr marL="91425" marR="91425" marT="91425" marB="91425"/>
-                </a:tc>
-                <a:tc>
-                  <a:txBody>
-                    <a:bodyPr/>
-                    <a:lstStyle/>
-                    <a:p>
-                      <a:pPr marL="0" marR="0" lvl="0" indent="0" algn="l" rtl="0">
-                        <a:lnSpc>
-                          <a:spcPct val="100000"/>
-                        </a:lnSpc>
-                        <a:spcBef>
-                          <a:spcPts val="0"/>
-                        </a:spcBef>
-                        <a:spcAft>
-                          <a:spcPts val="0"/>
-                        </a:spcAft>
-                        <a:buNone/>
-                      </a:pPr>
-                      <a:r>
-                        <a:rPr lang="en-GB" sz="1200">
-                          <a:solidFill>
-                            <a:srgbClr val="FFFFFF"/>
-                          </a:solidFill>
-                        </a:rPr>
-                        <a:t>277</a:t>
-                      </a:r>
-                      <a:endParaRPr sz="1200">
-                        <a:solidFill>
-                          <a:srgbClr val="FFFFFF"/>
-                        </a:solidFill>
-                      </a:endParaRPr>
-                    </a:p>
-                  </a:txBody>
-                  <a:tcPr marL="91425" marR="91425" marT="91425" marB="91425"/>
-                </a:tc>
-                <a:tc>
-                  <a:txBody>
-                    <a:bodyPr/>
-                    <a:lstStyle/>
-                    <a:p>
-                      <a:pPr marL="0" marR="0" lvl="0" indent="0" algn="l" rtl="0">
-                        <a:lnSpc>
-                          <a:spcPct val="100000"/>
-                        </a:lnSpc>
-                        <a:spcBef>
-                          <a:spcPts val="0"/>
-                        </a:spcBef>
-                        <a:spcAft>
-                          <a:spcPts val="0"/>
-                        </a:spcAft>
-                        <a:buNone/>
-                      </a:pPr>
-                      <a:r>
-                        <a:rPr lang="en-GB" sz="1200">
-                          <a:solidFill>
-                            <a:srgbClr val="FFFFFF"/>
-                          </a:solidFill>
-                        </a:rPr>
-                        <a:t>OSMutexPost</a:t>
-                      </a:r>
-                      <a:endParaRPr sz="1200">
-                        <a:solidFill>
-                          <a:srgbClr val="FFFFFF"/>
-                        </a:solidFill>
-                      </a:endParaRPr>
-                    </a:p>
-                  </a:txBody>
-                  <a:tcPr marL="91425" marR="91425" marT="91425" marB="91425">
-                    <a:lnT w="9525" cap="flat" cmpd="sng">
-                      <a:solidFill>
-                        <a:srgbClr val="9E9E9E"/>
-                      </a:solidFill>
-                      <a:prstDash val="solid"/>
-                      <a:round/>
-                      <a:headEnd type="none" w="sm" len="sm"/>
-                      <a:tailEnd type="none" w="sm" len="sm"/>
-                    </a:lnT>
-                    <a:lnB w="9525" cap="flat" cmpd="sng">
-                      <a:solidFill>
-                        <a:srgbClr val="9E9E9E"/>
-                      </a:solidFill>
-                      <a:prstDash val="solid"/>
-                      <a:round/>
-                      <a:headEnd type="none" w="sm" len="sm"/>
-                      <a:tailEnd type="none" w="sm" len="sm"/>
-                    </a:lnB>
-                  </a:tcPr>
-                </a:tc>
-                <a:tc>
-                  <a:txBody>
-                    <a:bodyPr/>
-                    <a:lstStyle/>
-                    <a:p>
-                      <a:pPr marL="0" marR="0" lvl="0" indent="0" algn="l" rtl="0">
-                        <a:lnSpc>
-                          <a:spcPct val="100000"/>
-                        </a:lnSpc>
-                        <a:spcBef>
-                          <a:spcPts val="0"/>
-                        </a:spcBef>
-                        <a:spcAft>
-                          <a:spcPts val="0"/>
-                        </a:spcAft>
-                        <a:buNone/>
-                      </a:pPr>
-                      <a:r>
-                        <a:rPr lang="en-GB" sz="1200">
-                          <a:solidFill>
-                            <a:srgbClr val="FFFFFF"/>
-                          </a:solidFill>
-                        </a:rPr>
-                        <a:t>168</a:t>
-                      </a:r>
-                      <a:endParaRPr sz="1200">
-                        <a:solidFill>
-                          <a:srgbClr val="FFFFFF"/>
-                        </a:solidFill>
-                      </a:endParaRPr>
-                    </a:p>
-                  </a:txBody>
-                  <a:tcPr marL="91425" marR="91425" marT="91425" marB="91425">
-                    <a:lnT w="9525" cap="flat" cmpd="sng">
-                      <a:solidFill>
-                        <a:srgbClr val="9E9E9E"/>
-                      </a:solidFill>
-                      <a:prstDash val="solid"/>
-                      <a:round/>
-                      <a:headEnd type="none" w="sm" len="sm"/>
-                      <a:tailEnd type="none" w="sm" len="sm"/>
-                    </a:lnT>
-                    <a:lnB w="9525" cap="flat" cmpd="sng">
-                      <a:solidFill>
-                        <a:srgbClr val="9E9E9E"/>
-                      </a:solidFill>
-                      <a:prstDash val="solid"/>
-                      <a:round/>
-                      <a:headEnd type="none" w="sm" len="sm"/>
-                      <a:tailEnd type="none" w="sm" len="sm"/>
-                    </a:lnB>
-                  </a:tcPr>
-                </a:tc>
-                <a:extLst>
-                  <a:ext uri="{0D108BD9-81ED-4DB2-BD59-A6C34878D82A}">
-                    <a16:rowId xmlns:a16="http://schemas.microsoft.com/office/drawing/2014/main" val="10002"/>
-                  </a:ext>
-                </a:extLst>
-              </a:tr>
-              <a:tr h="521475">
-                <a:tc>
-                  <a:txBody>
-                    <a:bodyPr/>
-                    <a:lstStyle/>
-                    <a:p>
-                      <a:pPr marL="0" marR="0" lvl="0" indent="0" algn="l" rtl="0">
-                        <a:lnSpc>
-                          <a:spcPct val="100000"/>
-                        </a:lnSpc>
-                        <a:spcBef>
-                          <a:spcPts val="0"/>
-                        </a:spcBef>
-                        <a:spcAft>
-                          <a:spcPts val="0"/>
-                        </a:spcAft>
-                        <a:buNone/>
-                      </a:pPr>
-                      <a:r>
-                        <a:rPr lang="en-GB" sz="1200">
-                          <a:solidFill>
-                            <a:srgbClr val="FFFFFF"/>
-                          </a:solidFill>
-                        </a:rPr>
-                        <a:t>OS_revive_rec_task</a:t>
-                      </a:r>
-                      <a:endParaRPr sz="1200">
-                        <a:solidFill>
-                          <a:srgbClr val="FFFFFF"/>
-                        </a:solidFill>
-                      </a:endParaRPr>
-                    </a:p>
-                    <a:p>
-                      <a:pPr marL="0" marR="0" lvl="0" indent="0" algn="l" rtl="0">
-                        <a:lnSpc>
-                          <a:spcPct val="100000"/>
-                        </a:lnSpc>
-                        <a:spcBef>
-                          <a:spcPts val="0"/>
-                        </a:spcBef>
-                        <a:spcAft>
-                          <a:spcPts val="0"/>
-                        </a:spcAft>
-                        <a:buNone/>
-                      </a:pPr>
-                      <a:r>
-                        <a:rPr lang="en-GB" sz="1200">
-                          <a:solidFill>
-                            <a:srgbClr val="FFFFFF"/>
-                          </a:solidFill>
-                        </a:rPr>
-                        <a:t>(no tasks to revive)</a:t>
-                      </a:r>
-                      <a:endParaRPr sz="1200">
-                        <a:solidFill>
-                          <a:srgbClr val="FFFFFF"/>
-                        </a:solidFill>
-                      </a:endParaRPr>
-                    </a:p>
-                  </a:txBody>
-                  <a:tcPr marL="91425" marR="91425" marT="91425" marB="91425"/>
-                </a:tc>
-                <a:tc>
-                  <a:txBody>
-                    <a:bodyPr/>
-                    <a:lstStyle/>
-                    <a:p>
-                      <a:pPr marL="0" marR="0" lvl="0" indent="0" algn="l" rtl="0">
-                        <a:lnSpc>
-                          <a:spcPct val="100000"/>
-                        </a:lnSpc>
-                        <a:spcBef>
-                          <a:spcPts val="0"/>
-                        </a:spcBef>
-                        <a:spcAft>
-                          <a:spcPts val="0"/>
-                        </a:spcAft>
-                        <a:buNone/>
-                      </a:pPr>
-                      <a:r>
-                        <a:rPr lang="en-GB" sz="1200">
-                          <a:solidFill>
-                            <a:srgbClr val="FFFFFF"/>
-                          </a:solidFill>
-                        </a:rPr>
-                        <a:t>37</a:t>
-                      </a:r>
-                      <a:endParaRPr sz="1200">
-                        <a:solidFill>
-                          <a:srgbClr val="FFFFFF"/>
-                        </a:solidFill>
-                      </a:endParaRPr>
-                    </a:p>
-                  </a:txBody>
-                  <a:tcPr marL="91425" marR="91425" marT="91425" marB="91425"/>
-                </a:tc>
-                <a:tc>
-                  <a:txBody>
-                    <a:bodyPr/>
-                    <a:lstStyle/>
-                    <a:p>
-                      <a:pPr marL="0" marR="0" lvl="0" indent="0" algn="l" rtl="0">
-                        <a:lnSpc>
-                          <a:spcPct val="100000"/>
-                        </a:lnSpc>
-                        <a:spcBef>
-                          <a:spcPts val="0"/>
-                        </a:spcBef>
-                        <a:spcAft>
-                          <a:spcPts val="0"/>
-                        </a:spcAft>
-                        <a:buNone/>
-                      </a:pPr>
-                      <a:r>
-                        <a:rPr lang="en-GB" sz="1200">
-                          <a:solidFill>
-                            <a:srgbClr val="FFFFFF"/>
-                          </a:solidFill>
-                        </a:rPr>
-                        <a:t>stack_push</a:t>
-                      </a:r>
-                      <a:endParaRPr sz="1200">
-                        <a:solidFill>
-                          <a:srgbClr val="FFFFFF"/>
-                        </a:solidFill>
-                      </a:endParaRPr>
-                    </a:p>
-                  </a:txBody>
-                  <a:tcPr marL="91425" marR="91425" marT="91425" marB="91425"/>
-                </a:tc>
-                <a:tc>
-                  <a:txBody>
-                    <a:bodyPr/>
-                    <a:lstStyle/>
-                    <a:p>
-                      <a:pPr marL="0" marR="0" lvl="0" indent="0" algn="l" rtl="0">
-                        <a:lnSpc>
-                          <a:spcPct val="100000"/>
-                        </a:lnSpc>
-                        <a:spcBef>
-                          <a:spcPts val="0"/>
-                        </a:spcBef>
-                        <a:spcAft>
-                          <a:spcPts val="0"/>
-                        </a:spcAft>
-                        <a:buNone/>
-                      </a:pPr>
-                      <a:r>
-                        <a:rPr lang="en-GB" sz="1200">
-                          <a:solidFill>
-                            <a:srgbClr val="FFFFFF"/>
-                          </a:solidFill>
-                        </a:rPr>
-                        <a:t>37</a:t>
-                      </a:r>
-                      <a:endParaRPr sz="1200">
-                        <a:solidFill>
-                          <a:srgbClr val="FFFFFF"/>
-                        </a:solidFill>
-                      </a:endParaRPr>
-                    </a:p>
-                  </a:txBody>
-                  <a:tcPr marL="91425" marR="91425" marT="91425" marB="91425"/>
-                </a:tc>
-                <a:tc>
-                  <a:txBody>
-                    <a:bodyPr/>
-                    <a:lstStyle/>
-                    <a:p>
-                      <a:pPr marL="0" marR="0" lvl="0" indent="0" algn="l" rtl="0">
-                        <a:lnSpc>
-                          <a:spcPct val="100000"/>
-                        </a:lnSpc>
-                        <a:spcBef>
-                          <a:spcPts val="0"/>
-                        </a:spcBef>
-                        <a:spcAft>
-                          <a:spcPts val="0"/>
-                        </a:spcAft>
-                        <a:buNone/>
-                      </a:pPr>
-                      <a:r>
-                        <a:rPr lang="en-GB" sz="1200">
-                          <a:solidFill>
-                            <a:srgbClr val="FFFFFF"/>
-                          </a:solidFill>
-                        </a:rPr>
-                        <a:t>stack_pop</a:t>
-                      </a:r>
-                      <a:endParaRPr sz="1200">
-                        <a:solidFill>
-                          <a:srgbClr val="FFFFFF"/>
-                        </a:solidFill>
-                      </a:endParaRPr>
-                    </a:p>
-                  </a:txBody>
-                  <a:tcPr marL="91425" marR="91425" marT="91425" marB="91425">
-                    <a:lnT w="9525" cap="flat" cmpd="sng">
-                      <a:solidFill>
-                        <a:srgbClr val="9E9E9E"/>
-                      </a:solidFill>
-                      <a:prstDash val="solid"/>
-                      <a:round/>
-                      <a:headEnd type="none" w="sm" len="sm"/>
-                      <a:tailEnd type="none" w="sm" len="sm"/>
-                    </a:lnT>
-                    <a:lnB w="9525" cap="flat" cmpd="sng">
-                      <a:solidFill>
-                        <a:srgbClr val="9E9E9E"/>
-                      </a:solidFill>
-                      <a:prstDash val="solid"/>
-                      <a:round/>
-                      <a:headEnd type="none" w="sm" len="sm"/>
-                      <a:tailEnd type="none" w="sm" len="sm"/>
-                    </a:lnB>
-                  </a:tcPr>
-                </a:tc>
-                <a:tc>
-                  <a:txBody>
-                    <a:bodyPr/>
-                    <a:lstStyle/>
-                    <a:p>
-                      <a:pPr marL="0" marR="0" lvl="0" indent="0" algn="l" rtl="0">
-                        <a:lnSpc>
-                          <a:spcPct val="100000"/>
-                        </a:lnSpc>
-                        <a:spcBef>
-                          <a:spcPts val="0"/>
-                        </a:spcBef>
-                        <a:spcAft>
-                          <a:spcPts val="0"/>
-                        </a:spcAft>
-                        <a:buNone/>
-                      </a:pPr>
-                      <a:r>
-                        <a:rPr lang="en-GB" sz="1200">
-                          <a:solidFill>
-                            <a:srgbClr val="FFFFFF"/>
-                          </a:solidFill>
-                        </a:rPr>
-                        <a:t>29</a:t>
-                      </a:r>
-                      <a:endParaRPr sz="1200">
-                        <a:solidFill>
-                          <a:srgbClr val="FFFFFF"/>
-                        </a:solidFill>
-                      </a:endParaRPr>
-                    </a:p>
-                  </a:txBody>
-                  <a:tcPr marL="91425" marR="91425" marT="91425" marB="91425">
-                    <a:lnT w="9525" cap="flat" cmpd="sng">
-                      <a:solidFill>
-                        <a:srgbClr val="9E9E9E"/>
-                      </a:solidFill>
-                      <a:prstDash val="solid"/>
-                      <a:round/>
-                      <a:headEnd type="none" w="sm" len="sm"/>
-                      <a:tailEnd type="none" w="sm" len="sm"/>
-                    </a:lnT>
-                    <a:lnB w="9525" cap="flat" cmpd="sng">
-                      <a:solidFill>
-                        <a:srgbClr val="9E9E9E"/>
-                      </a:solidFill>
-                      <a:prstDash val="solid"/>
-                      <a:round/>
-                      <a:headEnd type="none" w="sm" len="sm"/>
-                      <a:tailEnd type="none" w="sm" len="sm"/>
-                    </a:lnB>
-                  </a:tcPr>
-                </a:tc>
-                <a:extLst>
-                  <a:ext uri="{0D108BD9-81ED-4DB2-BD59-A6C34878D82A}">
-                    <a16:rowId xmlns:a16="http://schemas.microsoft.com/office/drawing/2014/main" val="10003"/>
-                  </a:ext>
-                </a:extLst>
-              </a:tr>
-              <a:tr h="521475">
-                <a:tc>
-                  <a:txBody>
-                    <a:bodyPr/>
-                    <a:lstStyle/>
-                    <a:p>
-                      <a:pPr marL="0" marR="0" lvl="0" indent="0" algn="l" rtl="0">
-                        <a:lnSpc>
-                          <a:spcPct val="100000"/>
-                        </a:lnSpc>
-                        <a:spcBef>
-                          <a:spcPts val="0"/>
-                        </a:spcBef>
-                        <a:spcAft>
-                          <a:spcPts val="0"/>
-                        </a:spcAft>
-                        <a:buNone/>
-                      </a:pPr>
-                      <a:r>
-                        <a:rPr lang="en-GB" sz="1200">
-                          <a:solidFill>
-                            <a:srgbClr val="FFFFFF"/>
-                          </a:solidFill>
-                        </a:rPr>
-                        <a:t>rbtree_insert</a:t>
-                      </a:r>
-                      <a:endParaRPr sz="1200">
-                        <a:solidFill>
-                          <a:srgbClr val="FFFFFF"/>
-                        </a:solidFill>
-                      </a:endParaRPr>
-                    </a:p>
-                  </a:txBody>
-                  <a:tcPr marL="91425" marR="91425" marT="91425" marB="91425"/>
-                </a:tc>
-                <a:tc>
-                  <a:txBody>
-                    <a:bodyPr/>
-                    <a:lstStyle/>
-                    <a:p>
-                      <a:pPr marL="0" marR="0" lvl="0" indent="0" algn="l" rtl="0">
-                        <a:lnSpc>
-                          <a:spcPct val="100000"/>
-                        </a:lnSpc>
-                        <a:spcBef>
-                          <a:spcPts val="0"/>
-                        </a:spcBef>
-                        <a:spcAft>
-                          <a:spcPts val="0"/>
-                        </a:spcAft>
-                        <a:buNone/>
-                      </a:pPr>
-                      <a:r>
-                        <a:rPr lang="en-GB" sz="1200">
-                          <a:solidFill>
-                            <a:srgbClr val="FFFFFF"/>
-                          </a:solidFill>
-                        </a:rPr>
-                        <a:t>140</a:t>
-                      </a:r>
-                      <a:endParaRPr sz="1200">
-                        <a:solidFill>
-                          <a:srgbClr val="FFFFFF"/>
-                        </a:solidFill>
-                      </a:endParaRPr>
-                    </a:p>
-                  </a:txBody>
-                  <a:tcPr marL="91425" marR="91425" marT="91425" marB="91425"/>
-                </a:tc>
-                <a:tc>
-                  <a:txBody>
-                    <a:bodyPr/>
-                    <a:lstStyle/>
-                    <a:p>
-                      <a:pPr marL="0" marR="0" lvl="0" indent="0" algn="l" rtl="0">
-                        <a:lnSpc>
-                          <a:spcPct val="100000"/>
-                        </a:lnSpc>
-                        <a:spcBef>
-                          <a:spcPts val="0"/>
-                        </a:spcBef>
-                        <a:spcAft>
-                          <a:spcPts val="0"/>
-                        </a:spcAft>
-                        <a:buNone/>
-                      </a:pPr>
-                      <a:r>
-                        <a:rPr lang="en-GB" sz="1200">
-                          <a:solidFill>
-                            <a:srgbClr val="FFFFFF"/>
-                          </a:solidFill>
-                        </a:rPr>
-                        <a:t>rbtree_del</a:t>
-                      </a:r>
-                      <a:endParaRPr sz="1200">
-                        <a:solidFill>
-                          <a:srgbClr val="FFFFFF"/>
-                        </a:solidFill>
-                      </a:endParaRPr>
-                    </a:p>
-                  </a:txBody>
-                  <a:tcPr marL="91425" marR="91425" marT="91425" marB="91425"/>
-                </a:tc>
-                <a:tc>
-                  <a:txBody>
-                    <a:bodyPr/>
-                    <a:lstStyle/>
-                    <a:p>
-                      <a:pPr marL="0" marR="0" lvl="0" indent="0" algn="l" rtl="0">
-                        <a:lnSpc>
-                          <a:spcPct val="100000"/>
-                        </a:lnSpc>
-                        <a:spcBef>
-                          <a:spcPts val="0"/>
-                        </a:spcBef>
-                        <a:spcAft>
-                          <a:spcPts val="0"/>
-                        </a:spcAft>
-                        <a:buNone/>
-                      </a:pPr>
-                      <a:r>
-                        <a:rPr lang="en-GB" sz="1200">
-                          <a:solidFill>
-                            <a:srgbClr val="FFFFFF"/>
-                          </a:solidFill>
-                        </a:rPr>
-                        <a:t>200</a:t>
-                      </a:r>
-                      <a:endParaRPr sz="1200">
-                        <a:solidFill>
-                          <a:srgbClr val="FFFFFF"/>
-                        </a:solidFill>
-                      </a:endParaRPr>
-                    </a:p>
-                  </a:txBody>
-                  <a:tcPr marL="91425" marR="91425" marT="91425" marB="91425"/>
-                </a:tc>
-                <a:tc>
-                  <a:txBody>
-                    <a:bodyPr/>
-                    <a:lstStyle/>
-                    <a:p>
-                      <a:pPr marL="0" lvl="0" indent="0" rtl="0">
-                        <a:spcBef>
-                          <a:spcPts val="0"/>
-                        </a:spcBef>
-                        <a:spcAft>
-                          <a:spcPts val="0"/>
-                        </a:spcAft>
-                        <a:buNone/>
-                      </a:pPr>
-                      <a:endParaRPr/>
-                    </a:p>
-                  </a:txBody>
-                  <a:tcPr marL="91425" marR="91425" marT="91425" marB="91425">
-                    <a:lnT w="9525" cap="flat" cmpd="sng">
-                      <a:solidFill>
-                        <a:srgbClr val="9E9E9E"/>
-                      </a:solidFill>
-                      <a:prstDash val="solid"/>
-                      <a:round/>
-                      <a:headEnd type="none" w="sm" len="sm"/>
-                      <a:tailEnd type="none" w="sm" len="sm"/>
-                    </a:lnT>
-                  </a:tcPr>
-                </a:tc>
-                <a:tc>
-                  <a:txBody>
-                    <a:bodyPr/>
-                    <a:lstStyle/>
-                    <a:p>
-                      <a:pPr marL="0" lvl="0" indent="0" rtl="0">
-                        <a:spcBef>
-                          <a:spcPts val="0"/>
-                        </a:spcBef>
-                        <a:spcAft>
-                          <a:spcPts val="0"/>
-                        </a:spcAft>
-                        <a:buNone/>
-                      </a:pPr>
-                      <a:endParaRPr/>
-                    </a:p>
-                  </a:txBody>
-                  <a:tcPr marL="91425" marR="91425" marT="91425" marB="91425">
-                    <a:lnT w="9525" cap="flat" cmpd="sng">
-                      <a:solidFill>
-                        <a:srgbClr val="9E9E9E"/>
-                      </a:solidFill>
-                      <a:prstDash val="solid"/>
-                      <a:round/>
-                      <a:headEnd type="none" w="sm" len="sm"/>
-                      <a:tailEnd type="none" w="sm" len="sm"/>
-                    </a:lnT>
-                  </a:tcPr>
-                </a:tc>
-                <a:extLst>
-                  <a:ext uri="{0D108BD9-81ED-4DB2-BD59-A6C34878D82A}">
-                    <a16:rowId xmlns:a16="http://schemas.microsoft.com/office/drawing/2014/main" val="10004"/>
-                  </a:ext>
-                </a:extLst>
-              </a:tr>
-            </a:tbl>
-          </a:graphicData>
-        </a:graphic>
-      </p:graphicFrame>
-    </p:spTree>
-  </p:cSld>
-  <p:clrMapOvr>
-    <a:masterClrMapping/>
-  </p:clrMapOvr>
 </p:sld>
 </file>
 

</xml_diff>